<commit_message>
add kl divergence defintion
</commit_message>
<xml_diff>
--- a/document/information therory.pptx
+++ b/document/information therory.pptx
@@ -17,8 +17,9 @@
     <p:sldId id="378" r:id="rId11"/>
     <p:sldId id="377" r:id="rId12"/>
     <p:sldId id="280" r:id="rId13"/>
-    <p:sldId id="380" r:id="rId14"/>
-    <p:sldId id="381" r:id="rId15"/>
+    <p:sldId id="382" r:id="rId14"/>
+    <p:sldId id="380" r:id="rId15"/>
+    <p:sldId id="381" r:id="rId16"/>
   </p:sldIdLst>
   <p:sldSz cx="12192000" cy="6858000"/>
   <p:notesSz cx="6858000" cy="9144000"/>
@@ -5964,6 +5965,92 @@
           <a:p>
             <a:r>
               <a:rPr lang="en-US" altLang="ko-KR" dirty="0" smtClean="0"/>
+              <a:t>Appendix : KL </a:t>
+            </a:r>
+            <a:r>
+              <a:rPr lang="en-US" altLang="ko-KR" dirty="0" smtClean="0"/>
+              <a:t>divergence</a:t>
+            </a:r>
+            <a:endParaRPr lang="ko-KR" altLang="en-US" dirty="0"/>
+          </a:p>
+        </p:txBody>
+      </p:sp>
+      <p:pic>
+        <p:nvPicPr>
+          <p:cNvPr id="5" name="내용 개체 틀 4"/>
+          <p:cNvPicPr>
+            <a:picLocks noGrp="1" noChangeAspect="1"/>
+          </p:cNvPicPr>
+          <p:nvPr>
+            <p:ph idx="1"/>
+          </p:nvPr>
+        </p:nvPicPr>
+        <p:blipFill>
+          <a:blip r:embed="rId2">
+            <a:extLst>
+              <a:ext uri="{28A0092B-C50C-407E-A947-70E740481C1C}">
+                <a14:useLocalDpi xmlns:a14="http://schemas.microsoft.com/office/drawing/2010/main" val="0"/>
+              </a:ext>
+            </a:extLst>
+          </a:blip>
+          <a:stretch>
+            <a:fillRect/>
+          </a:stretch>
+        </p:blipFill>
+        <p:spPr>
+          <a:xfrm>
+            <a:off x="1818678" y="2186528"/>
+            <a:ext cx="8554644" cy="3629532"/>
+          </a:xfrm>
+        </p:spPr>
+      </p:pic>
+    </p:spTree>
+    <p:extLst>
+      <p:ext uri="{BB962C8B-B14F-4D97-AF65-F5344CB8AC3E}">
+        <p14:creationId xmlns:p14="http://schemas.microsoft.com/office/powerpoint/2010/main" val="3056767846"/>
+      </p:ext>
+    </p:extLst>
+  </p:cSld>
+  <p:clrMapOvr>
+    <a:masterClrMapping/>
+  </p:clrMapOvr>
+</p:sld>
+</file>
+
+<file path=ppt/slides/slide14.xml><?xml version="1.0" encoding="utf-8"?>
+<p:sld xmlns:a="http://schemas.openxmlformats.org/drawingml/2006/main" xmlns:r="http://schemas.openxmlformats.org/officeDocument/2006/relationships" xmlns:p="http://schemas.openxmlformats.org/presentationml/2006/main">
+  <p:cSld>
+    <p:spTree>
+      <p:nvGrpSpPr>
+        <p:cNvPr id="1" name=""/>
+        <p:cNvGrpSpPr/>
+        <p:nvPr/>
+      </p:nvGrpSpPr>
+      <p:grpSpPr>
+        <a:xfrm>
+          <a:off x="0" y="0"/>
+          <a:ext cx="0" cy="0"/>
+          <a:chOff x="0" y="0"/>
+          <a:chExt cx="0" cy="0"/>
+        </a:xfrm>
+      </p:grpSpPr>
+      <p:sp>
+        <p:nvSpPr>
+          <p:cNvPr id="2" name="제목 1"/>
+          <p:cNvSpPr>
+            <a:spLocks noGrp="1"/>
+          </p:cNvSpPr>
+          <p:nvPr>
+            <p:ph type="title"/>
+          </p:nvPr>
+        </p:nvSpPr>
+        <p:spPr/>
+        <p:txBody>
+          <a:bodyPr/>
+          <a:lstStyle/>
+          <a:p>
+            <a:r>
+              <a:rPr lang="en-US" altLang="ko-KR" dirty="0" smtClean="0"/>
               <a:t>Appendix : KL divergence, JS divergence</a:t>
             </a:r>
             <a:endParaRPr lang="ko-KR" altLang="en-US" dirty="0"/>
@@ -6012,7 +6099,7 @@
 </p:sld>
 </file>
 
-<file path=ppt/slides/slide14.xml><?xml version="1.0" encoding="utf-8"?>
+<file path=ppt/slides/slide15.xml><?xml version="1.0" encoding="utf-8"?>
 <p:sld xmlns:a="http://schemas.openxmlformats.org/drawingml/2006/main" xmlns:r="http://schemas.openxmlformats.org/officeDocument/2006/relationships" xmlns:p="http://schemas.openxmlformats.org/presentationml/2006/main">
   <p:cSld>
     <p:spTree>

</xml_diff>